<commit_message>
Updated schematics with Key (power down)
</commit_message>
<xml_diff>
--- a/doc/ParkingLotCircuit.pptx
+++ b/doc/ParkingLotCircuit.pptx
@@ -104,6 +104,22 @@
       </a:defRPr>
     </a:lvl9pPr>
   </p:defaultTextStyle>
+  <p:extLst>
+    <p:ext uri="{EFAFB233-063F-42B5-8137-9DF3F51BA10A}">
+      <p15:sldGuideLst xmlns:p15="http://schemas.microsoft.com/office/powerpoint/2012/main">
+        <p15:guide id="1" orient="horz" pos="2160">
+          <p15:clr>
+            <a:srgbClr val="A4A3A4"/>
+          </p15:clr>
+        </p15:guide>
+        <p15:guide id="2" pos="2880">
+          <p15:clr>
+            <a:srgbClr val="A4A3A4"/>
+          </p15:clr>
+        </p15:guide>
+      </p15:sldGuideLst>
+    </p:ext>
+  </p:extLst>
 </p:presentation>
 </file>
 
@@ -288,7 +304,7 @@
           <a:p>
             <a:fld id="{09C988CA-3208-4BB6-8205-B7D97D618A1C}" type="datetimeFigureOut">
               <a:rPr lang="sv-SE" smtClean="0"/>
-              <a:t>2016-01-21</a:t>
+              <a:t>2016-04-25</a:t>
             </a:fld>
             <a:endParaRPr lang="sv-SE"/>
           </a:p>
@@ -458,7 +474,7 @@
           <a:p>
             <a:fld id="{09C988CA-3208-4BB6-8205-B7D97D618A1C}" type="datetimeFigureOut">
               <a:rPr lang="sv-SE" smtClean="0"/>
-              <a:t>2016-01-21</a:t>
+              <a:t>2016-04-25</a:t>
             </a:fld>
             <a:endParaRPr lang="sv-SE"/>
           </a:p>
@@ -638,7 +654,7 @@
           <a:p>
             <a:fld id="{09C988CA-3208-4BB6-8205-B7D97D618A1C}" type="datetimeFigureOut">
               <a:rPr lang="sv-SE" smtClean="0"/>
-              <a:t>2016-01-21</a:t>
+              <a:t>2016-04-25</a:t>
             </a:fld>
             <a:endParaRPr lang="sv-SE"/>
           </a:p>
@@ -808,7 +824,7 @@
           <a:p>
             <a:fld id="{09C988CA-3208-4BB6-8205-B7D97D618A1C}" type="datetimeFigureOut">
               <a:rPr lang="sv-SE" smtClean="0"/>
-              <a:t>2016-01-21</a:t>
+              <a:t>2016-04-25</a:t>
             </a:fld>
             <a:endParaRPr lang="sv-SE"/>
           </a:p>
@@ -1054,7 +1070,7 @@
           <a:p>
             <a:fld id="{09C988CA-3208-4BB6-8205-B7D97D618A1C}" type="datetimeFigureOut">
               <a:rPr lang="sv-SE" smtClean="0"/>
-              <a:t>2016-01-21</a:t>
+              <a:t>2016-04-25</a:t>
             </a:fld>
             <a:endParaRPr lang="sv-SE"/>
           </a:p>
@@ -1342,7 +1358,7 @@
           <a:p>
             <a:fld id="{09C988CA-3208-4BB6-8205-B7D97D618A1C}" type="datetimeFigureOut">
               <a:rPr lang="sv-SE" smtClean="0"/>
-              <a:t>2016-01-21</a:t>
+              <a:t>2016-04-25</a:t>
             </a:fld>
             <a:endParaRPr lang="sv-SE"/>
           </a:p>
@@ -1764,7 +1780,7 @@
           <a:p>
             <a:fld id="{09C988CA-3208-4BB6-8205-B7D97D618A1C}" type="datetimeFigureOut">
               <a:rPr lang="sv-SE" smtClean="0"/>
-              <a:t>2016-01-21</a:t>
+              <a:t>2016-04-25</a:t>
             </a:fld>
             <a:endParaRPr lang="sv-SE"/>
           </a:p>
@@ -1882,7 +1898,7 @@
           <a:p>
             <a:fld id="{09C988CA-3208-4BB6-8205-B7D97D618A1C}" type="datetimeFigureOut">
               <a:rPr lang="sv-SE" smtClean="0"/>
-              <a:t>2016-01-21</a:t>
+              <a:t>2016-04-25</a:t>
             </a:fld>
             <a:endParaRPr lang="sv-SE"/>
           </a:p>
@@ -1977,7 +1993,7 @@
           <a:p>
             <a:fld id="{09C988CA-3208-4BB6-8205-B7D97D618A1C}" type="datetimeFigureOut">
               <a:rPr lang="sv-SE" smtClean="0"/>
-              <a:t>2016-01-21</a:t>
+              <a:t>2016-04-25</a:t>
             </a:fld>
             <a:endParaRPr lang="sv-SE"/>
           </a:p>
@@ -2254,7 +2270,7 @@
           <a:p>
             <a:fld id="{09C988CA-3208-4BB6-8205-B7D97D618A1C}" type="datetimeFigureOut">
               <a:rPr lang="sv-SE" smtClean="0"/>
-              <a:t>2016-01-21</a:t>
+              <a:t>2016-04-25</a:t>
             </a:fld>
             <a:endParaRPr lang="sv-SE"/>
           </a:p>
@@ -2507,7 +2523,7 @@
           <a:p>
             <a:fld id="{09C988CA-3208-4BB6-8205-B7D97D618A1C}" type="datetimeFigureOut">
               <a:rPr lang="sv-SE" smtClean="0"/>
-              <a:t>2016-01-21</a:t>
+              <a:t>2016-04-25</a:t>
             </a:fld>
             <a:endParaRPr lang="sv-SE"/>
           </a:p>
@@ -2720,7 +2736,7 @@
           <a:p>
             <a:fld id="{09C988CA-3208-4BB6-8205-B7D97D618A1C}" type="datetimeFigureOut">
               <a:rPr lang="sv-SE" smtClean="0"/>
-              <a:t>2016-01-21</a:t>
+              <a:t>2016-04-25</a:t>
             </a:fld>
             <a:endParaRPr lang="sv-SE"/>
           </a:p>
@@ -4123,9 +4139,14 @@
           </a:p>
           <a:p>
             <a:r>
+              <a:rPr lang="sv-SE" sz="1000" dirty="0" err="1" smtClean="0"/>
+              <a:t>Arduino</a:t>
+            </a:r>
+            <a:r>
               <a:rPr lang="sv-SE" sz="1000" dirty="0" smtClean="0"/>
-              <a:t>GROUND</a:t>
-            </a:r>
+              <a:t>: 5</a:t>
+            </a:r>
+            <a:endParaRPr lang="sv-SE" sz="1000" dirty="0" smtClean="0"/>
           </a:p>
           <a:p>
             <a:endParaRPr lang="sv-SE" sz="1000" dirty="0" smtClean="0"/>
@@ -4229,7 +4250,6 @@
                 <a:rPr lang="sv-SE" sz="1000" dirty="0" smtClean="0"/>
                 <a:t>10</a:t>
               </a:r>
-              <a:endParaRPr lang="sv-SE" sz="1000" dirty="0" smtClean="0"/>
             </a:p>
             <a:p>
               <a:pPr algn="r"/>
@@ -4677,6 +4697,14 @@
               <a:endParaRPr lang="sv-SE" sz="1000" dirty="0" smtClean="0"/>
             </a:p>
             <a:p>
+              <a:r>
+                <a:rPr lang="sv-SE" sz="1000" dirty="0" err="1" smtClean="0"/>
+                <a:t>Fona</a:t>
+              </a:r>
+              <a:r>
+                <a:rPr lang="sv-SE" sz="1000" dirty="0" smtClean="0"/>
+                <a:t>: KEY</a:t>
+              </a:r>
               <a:endParaRPr lang="sv-SE" sz="1000" dirty="0" smtClean="0"/>
             </a:p>
             <a:p>
@@ -4859,39 +4887,6 @@
         </p:sp>
         <p:cxnSp>
           <p:nvCxnSpPr>
-            <p:cNvPr id="54" name="Straight Arrow Connector 53"/>
-            <p:cNvCxnSpPr/>
-            <p:nvPr/>
-          </p:nvCxnSpPr>
-          <p:spPr>
-            <a:xfrm rot="16200000" flipV="1">
-              <a:off x="-1353022" y="1779473"/>
-              <a:ext cx="360040" cy="0"/>
-            </a:xfrm>
-            <a:prstGeom prst="straightConnector1">
-              <a:avLst/>
-            </a:prstGeom>
-            <a:ln>
-              <a:tailEnd type="arrow"/>
-            </a:ln>
-          </p:spPr>
-          <p:style>
-            <a:lnRef idx="1">
-              <a:schemeClr val="accent1"/>
-            </a:lnRef>
-            <a:fillRef idx="0">
-              <a:schemeClr val="accent1"/>
-            </a:fillRef>
-            <a:effectRef idx="0">
-              <a:schemeClr val="accent1"/>
-            </a:effectRef>
-            <a:fontRef idx="minor">
-              <a:schemeClr val="tx1"/>
-            </a:fontRef>
-          </p:style>
-        </p:cxnSp>
-        <p:cxnSp>
-          <p:nvCxnSpPr>
             <p:cNvPr id="55" name="Straight Arrow Connector 54"/>
             <p:cNvCxnSpPr/>
             <p:nvPr/>
@@ -5074,16 +5069,17 @@
             </a:p>
             <a:p>
               <a:pPr algn="r"/>
+              <a:endParaRPr lang="sv-SE" sz="1000" dirty="0" smtClean="0"/>
+            </a:p>
+            <a:p>
+              <a:pPr algn="r"/>
               <a:r>
                 <a:rPr lang="sv-SE" sz="1000" dirty="0" smtClean="0"/>
-                <a:t>Fona: Key</a:t>
-              </a:r>
-            </a:p>
-            <a:p>
-              <a:pPr algn="r"/>
+                <a:t>Vin </a:t>
+              </a:r>
               <a:r>
                 <a:rPr lang="sv-SE" sz="1000" dirty="0" smtClean="0"/>
-                <a:t>Vin (7-12V)</a:t>
+                <a:t>(7-12V)</a:t>
               </a:r>
             </a:p>
           </p:txBody>
@@ -5277,6 +5273,39 @@
         <p:spPr>
           <a:xfrm rot="5400000">
             <a:off x="3341738" y="3665788"/>
+            <a:ext cx="360040" cy="0"/>
+          </a:xfrm>
+          <a:prstGeom prst="straightConnector1">
+            <a:avLst/>
+          </a:prstGeom>
+          <a:ln>
+            <a:tailEnd type="arrow"/>
+          </a:ln>
+        </p:spPr>
+        <p:style>
+          <a:lnRef idx="1">
+            <a:schemeClr val="accent1"/>
+          </a:lnRef>
+          <a:fillRef idx="0">
+            <a:schemeClr val="accent1"/>
+          </a:fillRef>
+          <a:effectRef idx="0">
+            <a:schemeClr val="accent1"/>
+          </a:effectRef>
+          <a:fontRef idx="minor">
+            <a:schemeClr val="tx1"/>
+          </a:fontRef>
+        </p:style>
+      </p:cxnSp>
+      <p:cxnSp>
+        <p:nvCxnSpPr>
+          <p:cNvPr id="52" name="Straight Arrow Connector 51"/>
+          <p:cNvCxnSpPr/>
+          <p:nvPr/>
+        </p:nvCxnSpPr>
+        <p:spPr>
+          <a:xfrm rot="5400000">
+            <a:off x="1972707" y="3684270"/>
             <a:ext cx="360040" cy="0"/>
           </a:xfrm>
           <a:prstGeom prst="straightConnector1">

</xml_diff>